<commit_message>
Forgot to change a line
</commit_message>
<xml_diff>
--- a/Computer Graphics Chapter 7 Presentation.pptx
+++ b/Computer Graphics Chapter 7 Presentation.pptx
@@ -5973,8 +5973,8 @@
           </a:fontRef>
         </p:style>
       </p:cxnSp>
-      <mc:AlternateContent xmlns:mc="http://schemas.openxmlformats.org/markup-compatibility/2006" xmlns:a14="http://schemas.microsoft.com/office/drawing/2010/main">
-        <mc:Choice Requires="a14">
+      <mc:AlternateContent xmlns:mc="http://schemas.openxmlformats.org/markup-compatibility/2006">
+        <mc:Choice xmlns:a14="http://schemas.microsoft.com/office/drawing/2010/main" Requires="a14">
           <p:sp>
             <p:nvSpPr>
               <p:cNvPr id="3" name="Content Placeholder 2">
@@ -6003,12 +6003,6 @@
               </a:bodyPr>
               <a:lstStyle/>
               <a:p>
-                <a:r>
-                  <a:rPr lang="en-US" sz="2000" dirty="0"/>
-                  <a:t>Calculation for ray casting</a:t>
-                </a:r>
-              </a:p>
-              <a:p>
                 <a14:m>
                   <m:oMath xmlns:m="http://schemas.openxmlformats.org/officeDocument/2006/math">
                     <m:r>
@@ -6035,7 +6029,7 @@
             </p:txBody>
           </p:sp>
         </mc:Choice>
-        <mc:Fallback xmlns="">
+        <mc:Fallback>
           <p:sp>
             <p:nvSpPr>
               <p:cNvPr id="3" name="Content Placeholder 2">
@@ -6058,7 +6052,7 @@
                 <a:ext cx="9013052" cy="3327251"/>
               </a:xfrm>
               <a:blipFill>
-                <a:blip r:embed="rId4"/>
+                <a:blip r:embed="rId2"/>
                 <a:stretch>
                   <a:fillRect l="-609" t="-2015"/>
                 </a:stretch>

</xml_diff>